<commit_message>
PPT update + Temp storage of Physics Book PPT
</commit_message>
<xml_diff>
--- a/Book-PPT/Chap7.pptx
+++ b/Book-PPT/Chap7.pptx
@@ -645,7 +645,7 @@
           <a:p>
             <a:fld id="{0E6BA319-05E9-49EE-8F99-CA1240CA2757}" type="datetimeFigureOut">
               <a:rPr lang="en-US" smtClean="0"/>
-              <a:t>1/30/2017</a:t>
+              <a:t>2/8/2017</a:t>
             </a:fld>
             <a:endParaRPr lang="en-US"/>
           </a:p>
@@ -849,7 +849,7 @@
           <a:p>
             <a:fld id="{0E6BA319-05E9-49EE-8F99-CA1240CA2757}" type="datetimeFigureOut">
               <a:rPr lang="en-US" smtClean="0"/>
-              <a:t>1/30/2017</a:t>
+              <a:t>2/8/2017</a:t>
             </a:fld>
             <a:endParaRPr lang="en-US"/>
           </a:p>
@@ -1604,7 +1604,7 @@
           <a:p>
             <a:fld id="{0E6BA319-05E9-49EE-8F99-CA1240CA2757}" type="datetimeFigureOut">
               <a:rPr lang="en-US" smtClean="0"/>
-              <a:t>1/30/2017</a:t>
+              <a:t>2/8/2017</a:t>
             </a:fld>
             <a:endParaRPr lang="en-US"/>
           </a:p>
@@ -1860,7 +1860,7 @@
           <a:p>
             <a:fld id="{0E6BA319-05E9-49EE-8F99-CA1240CA2757}" type="datetimeFigureOut">
               <a:rPr lang="en-US" smtClean="0"/>
-              <a:t>1/30/2017</a:t>
+              <a:t>2/8/2017</a:t>
             </a:fld>
             <a:endParaRPr lang="en-US"/>
           </a:p>
@@ -2251,7 +2251,7 @@
           <a:p>
             <a:fld id="{0E6BA319-05E9-49EE-8F99-CA1240CA2757}" type="datetimeFigureOut">
               <a:rPr lang="en-US" smtClean="0"/>
-              <a:t>1/30/2017</a:t>
+              <a:t>2/8/2017</a:t>
             </a:fld>
             <a:endParaRPr lang="en-US"/>
           </a:p>
@@ -2393,7 +2393,7 @@
           <a:p>
             <a:fld id="{0E6BA319-05E9-49EE-8F99-CA1240CA2757}" type="datetimeFigureOut">
               <a:rPr lang="en-US" smtClean="0"/>
-              <a:t>1/30/2017</a:t>
+              <a:t>2/8/2017</a:t>
             </a:fld>
             <a:endParaRPr lang="en-US"/>
           </a:p>
@@ -2512,7 +2512,7 @@
           <a:p>
             <a:fld id="{0E6BA319-05E9-49EE-8F99-CA1240CA2757}" type="datetimeFigureOut">
               <a:rPr lang="en-US" smtClean="0"/>
-              <a:t>1/30/2017</a:t>
+              <a:t>2/8/2017</a:t>
             </a:fld>
             <a:endParaRPr lang="en-US"/>
           </a:p>
@@ -2813,7 +2813,7 @@
           <a:p>
             <a:fld id="{0E6BA319-05E9-49EE-8F99-CA1240CA2757}" type="datetimeFigureOut">
               <a:rPr lang="en-US" smtClean="0"/>
-              <a:t>1/30/2017</a:t>
+              <a:t>2/8/2017</a:t>
             </a:fld>
             <a:endParaRPr lang="en-US"/>
           </a:p>
@@ -3090,7 +3090,7 @@
           <a:p>
             <a:fld id="{0E6BA319-05E9-49EE-8F99-CA1240CA2757}" type="datetimeFigureOut">
               <a:rPr lang="en-US" smtClean="0"/>
-              <a:t>1/30/2017</a:t>
+              <a:t>2/8/2017</a:t>
             </a:fld>
             <a:endParaRPr lang="en-US"/>
           </a:p>
@@ -5841,6 +5841,13 @@
   <p:clrMapOvr>
     <a:masterClrMapping/>
   </p:clrMapOvr>
+  <p:timing>
+    <p:tnLst>
+      <p:par>
+        <p:cTn id="1" dur="indefinite" restart="never" nodeType="tmRoot"/>
+      </p:par>
+    </p:tnLst>
+  </p:timing>
 </p:sld>
 </file>
 
@@ -7902,6 +7909,13 @@
   <p:clrMapOvr>
     <a:masterClrMapping/>
   </p:clrMapOvr>
+  <p:timing>
+    <p:tnLst>
+      <p:par>
+        <p:cTn id="1" dur="indefinite" restart="never" nodeType="tmRoot"/>
+      </p:par>
+    </p:tnLst>
+  </p:timing>
 </p:sld>
 </file>
 
@@ -10075,6 +10089,13 @@
   <p:clrMapOvr>
     <a:masterClrMapping/>
   </p:clrMapOvr>
+  <p:timing>
+    <p:tnLst>
+      <p:par>
+        <p:cTn id="1" dur="indefinite" restart="never" nodeType="tmRoot"/>
+      </p:par>
+    </p:tnLst>
+  </p:timing>
 </p:sld>
 </file>
 
@@ -12779,7 +12800,7 @@
         </p:nvGrpSpPr>
         <p:grpSpPr>
           <a:xfrm>
-            <a:off x="7353299" y="-157321"/>
+            <a:off x="6229257" y="-1067261"/>
             <a:ext cx="5029201" cy="4953318"/>
             <a:chOff x="7162799" y="454024"/>
             <a:chExt cx="5029201" cy="4953318"/>
@@ -13060,7 +13081,12 @@
             <p:ph idx="1"/>
           </p:nvPr>
         </p:nvSpPr>
-        <p:spPr/>
+        <p:spPr>
+          <a:xfrm>
+            <a:off x="838200" y="1825625"/>
+            <a:ext cx="8087236" cy="4351338"/>
+          </a:xfrm>
+        </p:spPr>
         <p:txBody>
           <a:bodyPr>
             <a:normAutofit/>
@@ -13068,58 +13094,54 @@
           <a:lstStyle/>
           <a:p>
             <a:r>
-              <a:rPr lang="en-US" b="1" dirty="0" smtClean="0"/>
-              <a:t>Center(100, 100), Width=10</a:t>
-            </a:r>
-            <a:r>
               <a:rPr lang="en-US" dirty="0" smtClean="0">
                 <a:solidFill>
                   <a:srgbClr val="FF0000"/>
                 </a:solidFill>
               </a:rPr>
-              <a:t>, Viewport: [50, 100, 100, 100]</a:t>
-            </a:r>
-          </a:p>
-          <a:p>
-            <a:r>
-              <a:rPr lang="en-US" dirty="0" err="1" smtClean="0"/>
-              <a:t>WCx</a:t>
-            </a:r>
-            <a:r>
-              <a:rPr lang="en-US" dirty="0" smtClean="0"/>
-              <a:t>, </a:t>
-            </a:r>
-            <a:r>
-              <a:rPr lang="en-US" dirty="0" err="1" smtClean="0"/>
-              <a:t>WCy</a:t>
-            </a:r>
-            <a:endParaRPr lang="en-US" dirty="0" smtClean="0"/>
+              <a:t>Viewport: [50, 100, 100, 100]</a:t>
+            </a:r>
           </a:p>
           <a:p>
             <a:pPr lvl="1"/>
+            <a:r>
+              <a:rPr lang="en-US" dirty="0" smtClean="0"/>
+              <a:t>We know … HTML reports: </a:t>
+            </a:r>
+            <a:r>
+              <a:rPr lang="en-US" b="1" dirty="0" smtClean="0">
+                <a:solidFill>
+                  <a:srgbClr val="00B050"/>
+                </a:solidFill>
+              </a:rPr>
+              <a:t>(50</a:t>
+            </a:r>
             <a:r>
               <a:rPr lang="en-US" b="1" dirty="0">
                 <a:solidFill>
                   <a:srgbClr val="00B050"/>
                 </a:solidFill>
               </a:rPr>
-              <a:t>(50, 100): </a:t>
-            </a:r>
+              <a:t>, </a:t>
+            </a:r>
+            <a:r>
+              <a:rPr lang="en-US" b="1" dirty="0" smtClean="0">
+                <a:solidFill>
+                  <a:srgbClr val="00B050"/>
+                </a:solidFill>
+              </a:rPr>
+              <a:t>100)</a:t>
+            </a:r>
+          </a:p>
+          <a:p>
+            <a:pPr lvl="1"/>
             <a:r>
               <a:rPr lang="en-US" b="1" dirty="0" smtClean="0">
                 <a:solidFill>
                   <a:srgbClr val="FF0000"/>
                 </a:solidFill>
               </a:rPr>
-              <a:t>Red</a:t>
-            </a:r>
-            <a:r>
-              <a:rPr lang="en-US" b="1" dirty="0">
-                <a:solidFill>
-                  <a:srgbClr val="FF0000"/>
-                </a:solidFill>
-              </a:rPr>
-              <a:t>: </a:t>
+              <a:t>In Red DC: </a:t>
             </a:r>
             <a:r>
               <a:rPr lang="en-US" b="1" dirty="0" err="1">
@@ -13151,25 +13173,136 @@
                   <a:srgbClr val="FF0000"/>
                 </a:solidFill>
               </a:rPr>
-              <a:t>= </a:t>
-            </a:r>
+              <a:t>= 0</a:t>
+            </a:r>
+          </a:p>
+          <a:p>
+            <a:r>
+              <a:rPr lang="en-US" dirty="0" smtClean="0"/>
+              <a:t>Now for: </a:t>
+            </a:r>
+            <a:r>
+              <a:rPr lang="en-US" dirty="0" err="1" smtClean="0"/>
+              <a:t>WCx</a:t>
+            </a:r>
+            <a:r>
+              <a:rPr lang="en-US" dirty="0" smtClean="0"/>
+              <a:t>, </a:t>
+            </a:r>
+            <a:r>
+              <a:rPr lang="en-US" dirty="0" err="1" smtClean="0"/>
+              <a:t>WCy</a:t>
+            </a:r>
+            <a:r>
+              <a:rPr lang="en-US" dirty="0"/>
+              <a:t> </a:t>
+            </a:r>
+            <a:r>
+              <a:rPr lang="en-US" dirty="0" smtClean="0"/>
+              <a:t>(over the Red DC)</a:t>
+            </a:r>
+          </a:p>
+          <a:p>
+            <a:pPr lvl="1"/>
+            <a:r>
+              <a:rPr lang="en-US" b="1" dirty="0" smtClean="0"/>
+              <a:t>Center(100</a:t>
+            </a:r>
+            <a:r>
+              <a:rPr lang="en-US" b="1" dirty="0"/>
+              <a:t>, 100), </a:t>
+            </a:r>
+            <a:r>
+              <a:rPr lang="en-US" b="1" dirty="0" smtClean="0"/>
+              <a:t>Width=10</a:t>
+            </a:r>
+          </a:p>
+          <a:p>
+            <a:pPr lvl="1"/>
+            <a:r>
+              <a:rPr lang="en-US" b="1" dirty="0" smtClean="0"/>
+              <a:t>Lower-left = (</a:t>
+            </a:r>
+            <a:r>
+              <a:rPr lang="en-US" b="1" dirty="0" smtClean="0"/>
+              <a:t>100-10/2, 100-10/2) </a:t>
+            </a:r>
+            <a:r>
+              <a:rPr lang="en-US" b="1" dirty="0" smtClean="0"/>
+              <a:t>= (</a:t>
+            </a:r>
+            <a:r>
+              <a:rPr lang="en-US" b="1" dirty="0" smtClean="0"/>
+              <a:t>95, 95)</a:t>
+            </a:r>
+            <a:endParaRPr lang="en-US" b="1" dirty="0" smtClean="0"/>
+          </a:p>
+          <a:p>
+            <a:r>
+              <a:rPr lang="en-US" b="1" dirty="0" smtClean="0"/>
+              <a:t>So, </a:t>
+            </a:r>
+            <a:r>
+              <a:rPr lang="en-US" dirty="0" smtClean="0"/>
+              <a:t>the following are the same point</a:t>
+            </a:r>
+          </a:p>
+          <a:p>
+            <a:pPr lvl="1"/>
+            <a:r>
+              <a:rPr lang="en-US" b="1" dirty="0" smtClean="0">
+                <a:solidFill>
+                  <a:srgbClr val="00B050"/>
+                </a:solidFill>
+              </a:rPr>
+              <a:t>Canvas-(50</a:t>
+            </a:r>
+            <a:r>
+              <a:rPr lang="en-US" b="1" dirty="0">
+                <a:solidFill>
+                  <a:srgbClr val="00B050"/>
+                </a:solidFill>
+              </a:rPr>
+              <a:t>, 100</a:t>
+            </a:r>
+            <a:r>
+              <a:rPr lang="en-US" b="1" dirty="0" smtClean="0">
+                <a:solidFill>
+                  <a:srgbClr val="00B050"/>
+                </a:solidFill>
+              </a:rPr>
+              <a:t>)</a:t>
+            </a:r>
+          </a:p>
+          <a:p>
+            <a:pPr lvl="1"/>
             <a:r>
               <a:rPr lang="en-US" b="1" dirty="0" smtClean="0">
                 <a:solidFill>
                   <a:srgbClr val="FF0000"/>
                 </a:solidFill>
               </a:rPr>
-              <a:t>0</a:t>
-            </a:r>
-          </a:p>
-          <a:p>
-            <a:r>
-              <a:rPr lang="en-US" dirty="0" smtClean="0"/>
-              <a:t>Lower-left = (100-10, 100-10) = (90, 90)</a:t>
-            </a:r>
-            <a:endParaRPr lang="en-US" dirty="0"/>
-          </a:p>
-          <a:p>
+              <a:t>DC-(0, 0)</a:t>
+            </a:r>
+          </a:p>
+          <a:p>
+            <a:pPr lvl="1"/>
+            <a:r>
+              <a:rPr lang="en-US" b="1" dirty="0" smtClean="0"/>
+              <a:t>WC-</a:t>
+            </a:r>
+            <a:r>
+              <a:rPr lang="en-US" b="1" smtClean="0"/>
+              <a:t>(</a:t>
+            </a:r>
+            <a:r>
+              <a:rPr lang="en-US" b="1" smtClean="0"/>
+              <a:t>95, </a:t>
+            </a:r>
+            <a:r>
+              <a:rPr lang="en-US" b="1" dirty="0" smtClean="0"/>
+              <a:t>95)</a:t>
+            </a:r>
             <a:endParaRPr lang="en-US" b="1" dirty="0">
               <a:solidFill>
                 <a:srgbClr val="FF0000"/>
@@ -13189,7 +13322,7 @@
         </p:nvSpPr>
         <p:spPr>
           <a:xfrm>
-            <a:off x="7874635" y="3181825"/>
+            <a:off x="6754526" y="2287681"/>
             <a:ext cx="180340" cy="188756"/>
           </a:xfrm>
           <a:prstGeom prst="flowChartSummingJunction">
@@ -13241,7 +13374,7 @@
         </p:nvGrpSpPr>
         <p:grpSpPr>
           <a:xfrm>
-            <a:off x="1681160" y="4001294"/>
+            <a:off x="6623381" y="3886057"/>
             <a:ext cx="4001136" cy="2403396"/>
             <a:chOff x="3433760" y="3487264"/>
             <a:chExt cx="4001136" cy="2403396"/>
@@ -14222,7 +14355,7 @@
                   <a:srgbClr val="0070C0"/>
                 </a:solidFill>
               </a:rPr>
-              <a:t>(</a:t>
+              <a:t>Canvas (300</a:t>
             </a:r>
             <a:r>
               <a:rPr lang="en-US" b="1" dirty="0">
@@ -14230,7 +14363,7 @@
                   <a:srgbClr val="0070C0"/>
                 </a:solidFill>
               </a:rPr>
-              <a:t>300, 400): </a:t>
+              <a:t>, 400): </a:t>
             </a:r>
             <a:r>
               <a:rPr lang="en-US" b="1" dirty="0" smtClean="0">
@@ -15459,7 +15592,7 @@
         </p:spPr>
         <p:txBody>
           <a:bodyPr vert="horz" lIns="91440" tIns="45720" rIns="91440" bIns="45720" rtlCol="0">
-            <a:normAutofit fontScale="92500" lnSpcReduction="20000"/>
+            <a:normAutofit fontScale="85000" lnSpcReduction="10000"/>
           </a:bodyPr>
           <a:lstStyle>
             <a:lvl1pPr marL="228600" indent="-228600" algn="l" defTabSz="914400" rtl="0" eaLnBrk="1" latinLnBrk="0" hangingPunct="1">
@@ -15648,7 +15781,7 @@
                   <a:srgbClr val="0070C0"/>
                 </a:solidFill>
               </a:rPr>
-              <a:t>(300, 400): </a:t>
+              <a:t>Canvas (300, 400): </a:t>
             </a:r>
             <a:r>
               <a:rPr lang="en-US" b="1" dirty="0" smtClean="0">
@@ -16099,6 +16232,13 @@
   <p:clrMapOvr>
     <a:masterClrMapping/>
   </p:clrMapOvr>
+  <p:timing>
+    <p:tnLst>
+      <p:par>
+        <p:cTn id="1" dur="indefinite" restart="never" nodeType="tmRoot"/>
+      </p:par>
+    </p:tnLst>
+  </p:timing>
 </p:sld>
 </file>
 
@@ -17696,6 +17836,35 @@
           </a:prstGeom>
         </p:spPr>
       </p:pic>
+      <p:pic>
+        <p:nvPicPr>
+          <p:cNvPr id="7" name="Picture 6"/>
+          <p:cNvPicPr>
+            <a:picLocks noChangeAspect="1"/>
+          </p:cNvPicPr>
+          <p:nvPr/>
+        </p:nvPicPr>
+        <p:blipFill>
+          <a:blip r:embed="rId5"/>
+          <a:stretch>
+            <a:fillRect/>
+          </a:stretch>
+        </p:blipFill>
+        <p:spPr>
+          <a:xfrm>
+            <a:off x="8046235" y="2780764"/>
+            <a:ext cx="3884780" cy="445718"/>
+          </a:xfrm>
+          <a:prstGeom prst="rect">
+            <a:avLst/>
+          </a:prstGeom>
+          <a:ln w="41275">
+            <a:solidFill>
+              <a:srgbClr val="FF0000"/>
+            </a:solidFill>
+          </a:ln>
+        </p:spPr>
+      </p:pic>
     </p:spTree>
     <p:extLst>
       <p:ext uri="{BB962C8B-B14F-4D97-AF65-F5344CB8AC3E}">
@@ -17827,25 +17996,37 @@
           </a:p>
         </p:txBody>
       </p:sp>
-      <p:sp>
-        <p:nvSpPr>
-          <p:cNvPr id="3" name="Content Placeholder 2"/>
-          <p:cNvSpPr>
-            <a:spLocks noGrp="1"/>
-          </p:cNvSpPr>
+      <p:pic>
+        <p:nvPicPr>
+          <p:cNvPr id="6" name="Content Placeholder 5"/>
+          <p:cNvPicPr>
+            <a:picLocks noGrp="1" noChangeAspect="1"/>
+          </p:cNvPicPr>
           <p:nvPr>
             <p:ph idx="1"/>
           </p:nvPr>
-        </p:nvSpPr>
-        <p:spPr/>
-        <p:txBody>
-          <a:bodyPr/>
-          <a:lstStyle/>
-          <a:p>
-            <a:endParaRPr lang="en-US" dirty="0"/>
-          </a:p>
-        </p:txBody>
-      </p:sp>
+        </p:nvPicPr>
+        <p:blipFill>
+          <a:blip r:embed="rId2"/>
+          <a:stretch>
+            <a:fillRect/>
+          </a:stretch>
+        </p:blipFill>
+        <p:spPr>
+          <a:xfrm>
+            <a:off x="244218" y="2500400"/>
+            <a:ext cx="5657259" cy="906100"/>
+          </a:xfrm>
+          <a:prstGeom prst="rect">
+            <a:avLst/>
+          </a:prstGeom>
+          <a:ln w="38100">
+            <a:solidFill>
+              <a:srgbClr val="FF0000"/>
+            </a:solidFill>
+          </a:ln>
+        </p:spPr>
+      </p:pic>
       <p:pic>
         <p:nvPicPr>
           <p:cNvPr id="4" name="Picture 3"/>
@@ -17855,7 +18036,7 @@
           <p:nvPr/>
         </p:nvPicPr>
         <p:blipFill>
-          <a:blip r:embed="rId2"/>
+          <a:blip r:embed="rId3"/>
           <a:stretch>
             <a:fillRect/>
           </a:stretch>
@@ -17879,7 +18060,7 @@
           <p:nvPr/>
         </p:nvPicPr>
         <p:blipFill rotWithShape="1">
-          <a:blip r:embed="rId3"/>
+          <a:blip r:embed="rId4"/>
           <a:srcRect l="33209" t="-2554" r="1328" b="-1"/>
           <a:stretch/>
         </p:blipFill>
@@ -18247,6 +18428,13 @@
   <p:clrMapOvr>
     <a:masterClrMapping/>
   </p:clrMapOvr>
+  <p:timing>
+    <p:tnLst>
+      <p:par>
+        <p:cTn id="1" dur="indefinite" restart="never" nodeType="tmRoot"/>
+      </p:par>
+    </p:tnLst>
+  </p:timing>
 </p:sld>
 </file>
 
@@ -19070,6 +19258,13 @@
   <p:clrMapOvr>
     <a:masterClrMapping/>
   </p:clrMapOvr>
+  <p:timing>
+    <p:tnLst>
+      <p:par>
+        <p:cTn id="1" dur="indefinite" restart="never" nodeType="tmRoot"/>
+      </p:par>
+    </p:tnLst>
+  </p:timing>
 </p:sld>
 </file>
 
@@ -19634,6 +19829,13 @@
   <p:clrMapOvr>
     <a:masterClrMapping/>
   </p:clrMapOvr>
+  <p:timing>
+    <p:tnLst>
+      <p:par>
+        <p:cTn id="1" dur="indefinite" restart="never" nodeType="tmRoot"/>
+      </p:par>
+    </p:tnLst>
+  </p:timing>
 </p:sld>
 </file>
 

</xml_diff>

<commit_message>
small fix on slide 4
</commit_message>
<xml_diff>
--- a/Book-PPT/Chap7.pptx
+++ b/Book-PPT/Chap7.pptx
@@ -645,7 +645,7 @@
           <a:p>
             <a:fld id="{0E6BA319-05E9-49EE-8F99-CA1240CA2757}" type="datetimeFigureOut">
               <a:rPr lang="en-US" smtClean="0"/>
-              <a:t>2/8/2017</a:t>
+              <a:t>7/24/2017</a:t>
             </a:fld>
             <a:endParaRPr lang="en-US"/>
           </a:p>
@@ -849,7 +849,7 @@
           <a:p>
             <a:fld id="{0E6BA319-05E9-49EE-8F99-CA1240CA2757}" type="datetimeFigureOut">
               <a:rPr lang="en-US" smtClean="0"/>
-              <a:t>2/8/2017</a:t>
+              <a:t>7/24/2017</a:t>
             </a:fld>
             <a:endParaRPr lang="en-US"/>
           </a:p>
@@ -1604,7 +1604,7 @@
           <a:p>
             <a:fld id="{0E6BA319-05E9-49EE-8F99-CA1240CA2757}" type="datetimeFigureOut">
               <a:rPr lang="en-US" smtClean="0"/>
-              <a:t>2/8/2017</a:t>
+              <a:t>7/24/2017</a:t>
             </a:fld>
             <a:endParaRPr lang="en-US"/>
           </a:p>
@@ -1860,7 +1860,7 @@
           <a:p>
             <a:fld id="{0E6BA319-05E9-49EE-8F99-CA1240CA2757}" type="datetimeFigureOut">
               <a:rPr lang="en-US" smtClean="0"/>
-              <a:t>2/8/2017</a:t>
+              <a:t>7/24/2017</a:t>
             </a:fld>
             <a:endParaRPr lang="en-US"/>
           </a:p>
@@ -2251,7 +2251,7 @@
           <a:p>
             <a:fld id="{0E6BA319-05E9-49EE-8F99-CA1240CA2757}" type="datetimeFigureOut">
               <a:rPr lang="en-US" smtClean="0"/>
-              <a:t>2/8/2017</a:t>
+              <a:t>7/24/2017</a:t>
             </a:fld>
             <a:endParaRPr lang="en-US"/>
           </a:p>
@@ -2393,7 +2393,7 @@
           <a:p>
             <a:fld id="{0E6BA319-05E9-49EE-8F99-CA1240CA2757}" type="datetimeFigureOut">
               <a:rPr lang="en-US" smtClean="0"/>
-              <a:t>2/8/2017</a:t>
+              <a:t>7/24/2017</a:t>
             </a:fld>
             <a:endParaRPr lang="en-US"/>
           </a:p>
@@ -2512,7 +2512,7 @@
           <a:p>
             <a:fld id="{0E6BA319-05E9-49EE-8F99-CA1240CA2757}" type="datetimeFigureOut">
               <a:rPr lang="en-US" smtClean="0"/>
-              <a:t>2/8/2017</a:t>
+              <a:t>7/24/2017</a:t>
             </a:fld>
             <a:endParaRPr lang="en-US"/>
           </a:p>
@@ -2813,7 +2813,7 @@
           <a:p>
             <a:fld id="{0E6BA319-05E9-49EE-8F99-CA1240CA2757}" type="datetimeFigureOut">
               <a:rPr lang="en-US" smtClean="0"/>
-              <a:t>2/8/2017</a:t>
+              <a:t>7/24/2017</a:t>
             </a:fld>
             <a:endParaRPr lang="en-US"/>
           </a:p>
@@ -3090,7 +3090,7 @@
           <a:p>
             <a:fld id="{0E6BA319-05E9-49EE-8F99-CA1240CA2757}" type="datetimeFigureOut">
               <a:rPr lang="en-US" smtClean="0"/>
-              <a:t>2/8/2017</a:t>
+              <a:t>7/24/2017</a:t>
             </a:fld>
             <a:endParaRPr lang="en-US"/>
           </a:p>
@@ -9896,8 +9896,8 @@
           </a:p>
         </p:txBody>
       </p:sp>
-      <mc:AlternateContent xmlns:mc="http://schemas.openxmlformats.org/markup-compatibility/2006" xmlns:a14="http://schemas.microsoft.com/office/drawing/2010/main">
-        <mc:Choice Requires="a14">
+      <mc:AlternateContent xmlns:mc="http://schemas.openxmlformats.org/markup-compatibility/2006">
+        <mc:Choice xmlns:a14="http://schemas.microsoft.com/office/drawing/2010/main" Requires="a14">
           <p:sp>
             <p:nvSpPr>
               <p:cNvPr id="3" name="Content Placeholder 2"/>
@@ -10031,7 +10031,19 @@
                 <a:pPr lvl="1"/>
                 <a:r>
                   <a:rPr lang="en-US" dirty="0" smtClean="0"/>
-                  <a:t>WC Window (width and height)</a:t>
+                  <a:t>WC Window </a:t>
+                </a:r>
+                <a:r>
+                  <a:rPr lang="en-US" dirty="0" smtClean="0"/>
+                  <a:t>(center and </a:t>
+                </a:r>
+                <a:r>
+                  <a:rPr lang="en-US" smtClean="0"/>
+                  <a:t>width x height</a:t>
+                </a:r>
+                <a:r>
+                  <a:rPr lang="en-US" dirty="0" smtClean="0"/>
+                  <a:t>)</a:t>
                 </a:r>
               </a:p>
               <a:p>
@@ -10045,7 +10057,7 @@
             </p:txBody>
           </p:sp>
         </mc:Choice>
-        <mc:Fallback xmlns="">
+        <mc:Fallback>
           <p:sp>
             <p:nvSpPr>
               <p:cNvPr id="3" name="Content Placeholder 2"/>
@@ -13221,21 +13233,8 @@
             <a:pPr lvl="1"/>
             <a:r>
               <a:rPr lang="en-US" b="1" dirty="0" smtClean="0"/>
-              <a:t>Lower-left = (</a:t>
-            </a:r>
-            <a:r>
-              <a:rPr lang="en-US" b="1" dirty="0" smtClean="0"/>
-              <a:t>100-10/2, 100-10/2) </a:t>
-            </a:r>
-            <a:r>
-              <a:rPr lang="en-US" b="1" dirty="0" smtClean="0"/>
-              <a:t>= (</a:t>
-            </a:r>
-            <a:r>
-              <a:rPr lang="en-US" b="1" dirty="0" smtClean="0"/>
-              <a:t>95, 95)</a:t>
-            </a:r>
-            <a:endParaRPr lang="en-US" b="1" dirty="0" smtClean="0"/>
+              <a:t>Lower-left = (100-10/2, 100-10/2) = (95, 95)</a:t>
+            </a:r>
           </a:p>
           <a:p>
             <a:r>
@@ -13293,11 +13292,7 @@
             </a:r>
             <a:r>
               <a:rPr lang="en-US" b="1" smtClean="0"/>
-              <a:t>(</a:t>
-            </a:r>
-            <a:r>
-              <a:rPr lang="en-US" b="1" smtClean="0"/>
-              <a:t>95, </a:t>
+              <a:t>(95, </a:t>
             </a:r>
             <a:r>
               <a:rPr lang="en-US" b="1" dirty="0" smtClean="0"/>

</xml_diff>

<commit_message>
Fixed mouse-click to canvas coordinate: slide 53
</commit_message>
<xml_diff>
--- a/Book-PPT/Chap7.pptx
+++ b/Book-PPT/Chap7.pptx
@@ -645,7 +645,7 @@
           <a:p>
             <a:fld id="{0E6BA319-05E9-49EE-8F99-CA1240CA2757}" type="datetimeFigureOut">
               <a:rPr lang="en-US" smtClean="0"/>
-              <a:t>7/24/2017</a:t>
+              <a:t>7/25/2017</a:t>
             </a:fld>
             <a:endParaRPr lang="en-US"/>
           </a:p>
@@ -849,7 +849,7 @@
           <a:p>
             <a:fld id="{0E6BA319-05E9-49EE-8F99-CA1240CA2757}" type="datetimeFigureOut">
               <a:rPr lang="en-US" smtClean="0"/>
-              <a:t>7/24/2017</a:t>
+              <a:t>7/25/2017</a:t>
             </a:fld>
             <a:endParaRPr lang="en-US"/>
           </a:p>
@@ -1604,7 +1604,7 @@
           <a:p>
             <a:fld id="{0E6BA319-05E9-49EE-8F99-CA1240CA2757}" type="datetimeFigureOut">
               <a:rPr lang="en-US" smtClean="0"/>
-              <a:t>7/24/2017</a:t>
+              <a:t>7/25/2017</a:t>
             </a:fld>
             <a:endParaRPr lang="en-US"/>
           </a:p>
@@ -1860,7 +1860,7 @@
           <a:p>
             <a:fld id="{0E6BA319-05E9-49EE-8F99-CA1240CA2757}" type="datetimeFigureOut">
               <a:rPr lang="en-US" smtClean="0"/>
-              <a:t>7/24/2017</a:t>
+              <a:t>7/25/2017</a:t>
             </a:fld>
             <a:endParaRPr lang="en-US"/>
           </a:p>
@@ -2251,7 +2251,7 @@
           <a:p>
             <a:fld id="{0E6BA319-05E9-49EE-8F99-CA1240CA2757}" type="datetimeFigureOut">
               <a:rPr lang="en-US" smtClean="0"/>
-              <a:t>7/24/2017</a:t>
+              <a:t>7/25/2017</a:t>
             </a:fld>
             <a:endParaRPr lang="en-US"/>
           </a:p>
@@ -2393,7 +2393,7 @@
           <a:p>
             <a:fld id="{0E6BA319-05E9-49EE-8F99-CA1240CA2757}" type="datetimeFigureOut">
               <a:rPr lang="en-US" smtClean="0"/>
-              <a:t>7/24/2017</a:t>
+              <a:t>7/25/2017</a:t>
             </a:fld>
             <a:endParaRPr lang="en-US"/>
           </a:p>
@@ -2512,7 +2512,7 @@
           <a:p>
             <a:fld id="{0E6BA319-05E9-49EE-8F99-CA1240CA2757}" type="datetimeFigureOut">
               <a:rPr lang="en-US" smtClean="0"/>
-              <a:t>7/24/2017</a:t>
+              <a:t>7/25/2017</a:t>
             </a:fld>
             <a:endParaRPr lang="en-US"/>
           </a:p>
@@ -2813,7 +2813,7 @@
           <a:p>
             <a:fld id="{0E6BA319-05E9-49EE-8F99-CA1240CA2757}" type="datetimeFigureOut">
               <a:rPr lang="en-US" smtClean="0"/>
-              <a:t>7/24/2017</a:t>
+              <a:t>7/25/2017</a:t>
             </a:fld>
             <a:endParaRPr lang="en-US"/>
           </a:p>
@@ -3090,7 +3090,7 @@
           <a:p>
             <a:fld id="{0E6BA319-05E9-49EE-8F99-CA1240CA2757}" type="datetimeFigureOut">
               <a:rPr lang="en-US" smtClean="0"/>
-              <a:t>7/24/2017</a:t>
+              <a:t>7/25/2017</a:t>
             </a:fld>
             <a:endParaRPr lang="en-US"/>
           </a:p>
@@ -9896,8 +9896,8 @@
           </a:p>
         </p:txBody>
       </p:sp>
-      <mc:AlternateContent xmlns:mc="http://schemas.openxmlformats.org/markup-compatibility/2006">
-        <mc:Choice xmlns:a14="http://schemas.microsoft.com/office/drawing/2010/main" Requires="a14">
+      <mc:AlternateContent xmlns:mc="http://schemas.openxmlformats.org/markup-compatibility/2006" xmlns:a14="http://schemas.microsoft.com/office/drawing/2010/main">
+        <mc:Choice Requires="a14">
           <p:sp>
             <p:nvSpPr>
               <p:cNvPr id="3" name="Content Placeholder 2"/>
@@ -10031,19 +10031,7 @@
                 <a:pPr lvl="1"/>
                 <a:r>
                   <a:rPr lang="en-US" dirty="0" smtClean="0"/>
-                  <a:t>WC Window </a:t>
-                </a:r>
-                <a:r>
-                  <a:rPr lang="en-US" dirty="0" smtClean="0"/>
-                  <a:t>(center and </a:t>
-                </a:r>
-                <a:r>
-                  <a:rPr lang="en-US" smtClean="0"/>
-                  <a:t>width x height</a:t>
-                </a:r>
-                <a:r>
-                  <a:rPr lang="en-US" dirty="0" smtClean="0"/>
-                  <a:t>)</a:t>
+                  <a:t>WC Window (width and height)</a:t>
                 </a:r>
               </a:p>
               <a:p>
@@ -10057,7 +10045,7 @@
             </p:txBody>
           </p:sp>
         </mc:Choice>
-        <mc:Fallback>
+        <mc:Fallback xmlns="">
           <p:sp>
             <p:nvSpPr>
               <p:cNvPr id="3" name="Content Placeholder 2"/>
@@ -15473,7 +15461,7 @@
           </a:p>
           <a:p>
             <a:r>
-              <a:rPr lang="en-US" smtClean="0"/>
+              <a:rPr lang="en-US" dirty="0" err="1" smtClean="0"/>
               <a:t>DCx</a:t>
             </a:r>
             <a:r>
@@ -17018,52 +17006,6 @@
           </a:prstGeom>
         </p:spPr>
       </p:pic>
-      <p:pic>
-        <p:nvPicPr>
-          <p:cNvPr id="6" name="Picture 5"/>
-          <p:cNvPicPr>
-            <a:picLocks noChangeAspect="1"/>
-          </p:cNvPicPr>
-          <p:nvPr/>
-        </p:nvPicPr>
-        <p:blipFill rotWithShape="1">
-          <a:blip r:embed="rId3"/>
-          <a:srcRect l="41410" t="10943" b="6711"/>
-          <a:stretch/>
-        </p:blipFill>
-        <p:spPr>
-          <a:xfrm>
-            <a:off x="8498987" y="1690688"/>
-            <a:ext cx="2745437" cy="1601869"/>
-          </a:xfrm>
-          <a:prstGeom prst="rect">
-            <a:avLst/>
-          </a:prstGeom>
-        </p:spPr>
-      </p:pic>
-      <p:pic>
-        <p:nvPicPr>
-          <p:cNvPr id="7" name="Picture 6"/>
-          <p:cNvPicPr>
-            <a:picLocks noChangeAspect="1"/>
-          </p:cNvPicPr>
-          <p:nvPr/>
-        </p:nvPicPr>
-        <p:blipFill rotWithShape="1">
-          <a:blip r:embed="rId4"/>
-          <a:srcRect l="33209" t="16159" r="1328"/>
-          <a:stretch/>
-        </p:blipFill>
-        <p:spPr>
-          <a:xfrm>
-            <a:off x="8416867" y="4001294"/>
-            <a:ext cx="3043168" cy="1943024"/>
-          </a:xfrm>
-          <a:prstGeom prst="rect">
-            <a:avLst/>
-          </a:prstGeom>
-        </p:spPr>
-      </p:pic>
       <p:sp>
         <p:nvSpPr>
           <p:cNvPr id="8" name="Rounded Rectangle 7"/>
@@ -17156,60 +17098,6 @@
                                         </p:cTn>
                                         <p:tgtEl>
                                           <p:spTgt spid="8"/>
-                                        </p:tgtEl>
-                                        <p:attrNameLst>
-                                          <p:attrName>style.visibility</p:attrName>
-                                        </p:attrNameLst>
-                                      </p:cBhvr>
-                                      <p:to>
-                                        <p:strVal val="visible"/>
-                                      </p:to>
-                                    </p:set>
-                                  </p:childTnLst>
-                                </p:cTn>
-                              </p:par>
-                              <p:par>
-                                <p:cTn id="7" presetID="1" presetClass="entr" presetSubtype="0" fill="hold" nodeType="withEffect">
-                                  <p:stCondLst>
-                                    <p:cond delay="0"/>
-                                  </p:stCondLst>
-                                  <p:childTnLst>
-                                    <p:set>
-                                      <p:cBhvr>
-                                        <p:cTn id="8" dur="1" fill="hold">
-                                          <p:stCondLst>
-                                            <p:cond delay="0"/>
-                                          </p:stCondLst>
-                                        </p:cTn>
-                                        <p:tgtEl>
-                                          <p:spTgt spid="6"/>
-                                        </p:tgtEl>
-                                        <p:attrNameLst>
-                                          <p:attrName>style.visibility</p:attrName>
-                                        </p:attrNameLst>
-                                      </p:cBhvr>
-                                      <p:to>
-                                        <p:strVal val="visible"/>
-                                      </p:to>
-                                    </p:set>
-                                  </p:childTnLst>
-                                </p:cTn>
-                              </p:par>
-                              <p:par>
-                                <p:cTn id="9" presetID="1" presetClass="entr" presetSubtype="0" fill="hold" nodeType="withEffect">
-                                  <p:stCondLst>
-                                    <p:cond delay="0"/>
-                                  </p:stCondLst>
-                                  <p:childTnLst>
-                                    <p:set>
-                                      <p:cBhvr>
-                                        <p:cTn id="10" dur="1" fill="hold">
-                                          <p:stCondLst>
-                                            <p:cond delay="0"/>
-                                          </p:stCondLst>
-                                        </p:cTn>
-                                        <p:tgtEl>
-                                          <p:spTgt spid="7"/>
                                         </p:tgtEl>
                                         <p:attrNameLst>
                                           <p:attrName>style.visibility</p:attrName>

</xml_diff>